<commit_message>
Agregando detalles a los informes
</commit_message>
<xml_diff>
--- a/C++11,C++14.pptx
+++ b/C++11,C++14.pptx
@@ -891,7 +891,7 @@
           <a:p>
             <a:fld id="{ABECD98E-C42D-4DA3-9016-1AD4A0D6096A}" type="datetimeFigureOut">
               <a:rPr lang="en-US" smtClean="0"/>
-              <a:t>10/11/2021</a:t>
+              <a:t>10/12/2021</a:t>
             </a:fld>
             <a:endParaRPr lang="en-US"/>
           </a:p>
@@ -1142,7 +1142,7 @@
           <a:p>
             <a:fld id="{ABECD98E-C42D-4DA3-9016-1AD4A0D6096A}" type="datetimeFigureOut">
               <a:rPr lang="en-US" smtClean="0"/>
-              <a:t>10/11/2021</a:t>
+              <a:t>10/12/2021</a:t>
             </a:fld>
             <a:endParaRPr lang="en-US"/>
           </a:p>
@@ -1456,7 +1456,7 @@
           <a:p>
             <a:fld id="{ABECD98E-C42D-4DA3-9016-1AD4A0D6096A}" type="datetimeFigureOut">
               <a:rPr lang="en-US" smtClean="0"/>
-              <a:t>10/11/2021</a:t>
+              <a:t>10/12/2021</a:t>
             </a:fld>
             <a:endParaRPr lang="en-US"/>
           </a:p>
@@ -1797,7 +1797,7 @@
           <a:p>
             <a:fld id="{ABECD98E-C42D-4DA3-9016-1AD4A0D6096A}" type="datetimeFigureOut">
               <a:rPr lang="en-US" smtClean="0"/>
-              <a:t>10/11/2021</a:t>
+              <a:t>10/12/2021</a:t>
             </a:fld>
             <a:endParaRPr lang="en-US"/>
           </a:p>
@@ -2111,7 +2111,7 @@
           <a:p>
             <a:fld id="{ABECD98E-C42D-4DA3-9016-1AD4A0D6096A}" type="datetimeFigureOut">
               <a:rPr lang="en-US" smtClean="0"/>
-              <a:t>10/11/2021</a:t>
+              <a:t>10/12/2021</a:t>
             </a:fld>
             <a:endParaRPr lang="en-US"/>
           </a:p>
@@ -2504,7 +2504,7 @@
           <a:p>
             <a:fld id="{ABECD98E-C42D-4DA3-9016-1AD4A0D6096A}" type="datetimeFigureOut">
               <a:rPr lang="en-US" smtClean="0"/>
-              <a:t>10/11/2021</a:t>
+              <a:t>10/12/2021</a:t>
             </a:fld>
             <a:endParaRPr lang="en-US"/>
           </a:p>
@@ -2674,7 +2674,7 @@
           <a:p>
             <a:fld id="{ABECD98E-C42D-4DA3-9016-1AD4A0D6096A}" type="datetimeFigureOut">
               <a:rPr lang="en-US" smtClean="0"/>
-              <a:t>10/11/2021</a:t>
+              <a:t>10/12/2021</a:t>
             </a:fld>
             <a:endParaRPr lang="en-US"/>
           </a:p>
@@ -2854,7 +2854,7 @@
           <a:p>
             <a:fld id="{ABECD98E-C42D-4DA3-9016-1AD4A0D6096A}" type="datetimeFigureOut">
               <a:rPr lang="en-US" smtClean="0"/>
-              <a:t>10/11/2021</a:t>
+              <a:t>10/12/2021</a:t>
             </a:fld>
             <a:endParaRPr lang="en-US"/>
           </a:p>
@@ -3030,7 +3030,7 @@
           <a:p>
             <a:fld id="{ABECD98E-C42D-4DA3-9016-1AD4A0D6096A}" type="datetimeFigureOut">
               <a:rPr lang="en-US" smtClean="0"/>
-              <a:t>10/11/2021</a:t>
+              <a:t>10/12/2021</a:t>
             </a:fld>
             <a:endParaRPr lang="en-US"/>
           </a:p>
@@ -3277,7 +3277,7 @@
           <a:p>
             <a:fld id="{ABECD98E-C42D-4DA3-9016-1AD4A0D6096A}" type="datetimeFigureOut">
               <a:rPr lang="en-US" smtClean="0"/>
-              <a:t>10/11/2021</a:t>
+              <a:t>10/12/2021</a:t>
             </a:fld>
             <a:endParaRPr lang="en-US"/>
           </a:p>
@@ -3509,7 +3509,7 @@
           <a:p>
             <a:fld id="{ABECD98E-C42D-4DA3-9016-1AD4A0D6096A}" type="datetimeFigureOut">
               <a:rPr lang="en-US" smtClean="0"/>
-              <a:t>10/11/2021</a:t>
+              <a:t>10/12/2021</a:t>
             </a:fld>
             <a:endParaRPr lang="en-US"/>
           </a:p>
@@ -3883,7 +3883,7 @@
           <a:p>
             <a:fld id="{ABECD98E-C42D-4DA3-9016-1AD4A0D6096A}" type="datetimeFigureOut">
               <a:rPr lang="en-US" smtClean="0"/>
-              <a:t>10/11/2021</a:t>
+              <a:t>10/12/2021</a:t>
             </a:fld>
             <a:endParaRPr lang="en-US"/>
           </a:p>
@@ -4006,7 +4006,7 @@
           <a:p>
             <a:fld id="{ABECD98E-C42D-4DA3-9016-1AD4A0D6096A}" type="datetimeFigureOut">
               <a:rPr lang="en-US" smtClean="0"/>
-              <a:t>10/11/2021</a:t>
+              <a:t>10/12/2021</a:t>
             </a:fld>
             <a:endParaRPr lang="en-US"/>
           </a:p>
@@ -4101,7 +4101,7 @@
           <a:p>
             <a:fld id="{ABECD98E-C42D-4DA3-9016-1AD4A0D6096A}" type="datetimeFigureOut">
               <a:rPr lang="en-US" smtClean="0"/>
-              <a:t>10/11/2021</a:t>
+              <a:t>10/12/2021</a:t>
             </a:fld>
             <a:endParaRPr lang="en-US"/>
           </a:p>
@@ -4356,7 +4356,7 @@
           <a:p>
             <a:fld id="{ABECD98E-C42D-4DA3-9016-1AD4A0D6096A}" type="datetimeFigureOut">
               <a:rPr lang="en-US" smtClean="0"/>
-              <a:t>10/11/2021</a:t>
+              <a:t>10/12/2021</a:t>
             </a:fld>
             <a:endParaRPr lang="en-US"/>
           </a:p>
@@ -4619,7 +4619,7 @@
           <a:p>
             <a:fld id="{ABECD98E-C42D-4DA3-9016-1AD4A0D6096A}" type="datetimeFigureOut">
               <a:rPr lang="en-US" smtClean="0"/>
-              <a:t>10/11/2021</a:t>
+              <a:t>10/12/2021</a:t>
             </a:fld>
             <a:endParaRPr lang="en-US"/>
           </a:p>
@@ -5362,7 +5362,7 @@
           <a:p>
             <a:fld id="{ABECD98E-C42D-4DA3-9016-1AD4A0D6096A}" type="datetimeFigureOut">
               <a:rPr lang="en-US" smtClean="0"/>
-              <a:t>10/11/2021</a:t>
+              <a:t>10/12/2021</a:t>
             </a:fld>
             <a:endParaRPr lang="en-US"/>
           </a:p>
@@ -5964,15 +5964,7 @@
           <a:p>
             <a:r>
               <a:rPr lang="en-US" dirty="0" smtClean="0"/>
-              <a:t>    Henri Daniel </a:t>
-            </a:r>
-            <a:r>
-              <a:rPr lang="en-US" dirty="0" smtClean="0"/>
-              <a:t>Peña </a:t>
-            </a:r>
-            <a:r>
-              <a:rPr lang="en-US" dirty="0" smtClean="0"/>
-              <a:t>Dequero</a:t>
+              <a:t>    Henri Daniel Peña Dequero</a:t>
             </a:r>
             <a:endParaRPr lang="en-US" dirty="0"/>
           </a:p>
@@ -7866,7 +7858,11 @@
           <a:p>
             <a:r>
               <a:rPr lang="es-419" dirty="0" smtClean="0"/>
-              <a:t>Permite instanciar </a:t>
+              <a:t>Permite </a:t>
+            </a:r>
+            <a:r>
+              <a:rPr lang="es-419" dirty="0" smtClean="0"/>
+              <a:t>inicializar </a:t>
             </a:r>
             <a:r>
               <a:rPr lang="es-419" dirty="0"/>
@@ -11494,11 +11490,7 @@
           <a:p>
             <a:r>
               <a:rPr lang="es-US" dirty="0" smtClean="0"/>
-              <a:t>-Inferencia de tipo</a:t>
-            </a:r>
-            <a:r>
-              <a:rPr lang="es-US" dirty="0" smtClean="0"/>
-              <a:t>.</a:t>
+              <a:t>-Inferencia de tipo.</a:t>
             </a:r>
           </a:p>
           <a:p>
@@ -15800,11 +15792,7 @@
             </a:pPr>
             <a:r>
               <a:rPr lang="es-419" dirty="0" smtClean="0"/>
-              <a:t>Esta</a:t>
-            </a:r>
-            <a:r>
-              <a:rPr lang="es-419" dirty="0" smtClean="0"/>
-              <a:t> </a:t>
+              <a:t>Esta </a:t>
             </a:r>
             <a:r>
               <a:rPr lang="es-419" dirty="0"/>
@@ -25413,15 +25401,7 @@
           <a:p>
             <a:r>
               <a:rPr lang="es-419" dirty="0" smtClean="0"/>
-              <a:t>¿ </a:t>
-            </a:r>
-            <a:r>
-              <a:rPr lang="es-419" dirty="0" smtClean="0"/>
-              <a:t>Cómo </a:t>
-            </a:r>
-            <a:r>
-              <a:rPr lang="es-419" dirty="0" smtClean="0"/>
-              <a:t>crear un puntero a función que </a:t>
+              <a:t>¿ Cómo crear un puntero a función que </a:t>
             </a:r>
             <a:r>
               <a:rPr lang="es-419" dirty="0"/>
@@ -37806,13 +37786,13 @@
         </p:nvSpPr>
         <p:spPr>
           <a:xfrm>
-            <a:off x="677334" y="1496291"/>
-            <a:ext cx="8596668" cy="4932218"/>
+            <a:off x="677334" y="1357745"/>
+            <a:ext cx="8813030" cy="5070764"/>
           </a:xfrm>
         </p:spPr>
         <p:txBody>
           <a:bodyPr>
-            <a:normAutofit/>
+            <a:normAutofit lnSpcReduction="10000"/>
           </a:bodyPr>
           <a:lstStyle/>
           <a:p>
@@ -38263,6 +38243,41 @@
               <a:t>value</a:t>
             </a:r>
             <a:r>
+              <a:rPr lang="en-US" sz="2000" b="1" dirty="0" smtClean="0">
+                <a:solidFill>
+                  <a:srgbClr val="000000"/>
+                </a:solidFill>
+                <a:latin typeface="Consolas" panose="020B0609020204030204" pitchFamily="49" charset="0"/>
+                <a:ea typeface="Calibri" panose="020F0502020204030204" pitchFamily="34" charset="0"/>
+                <a:cs typeface="Consolas" panose="020B0609020204030204" pitchFamily="49" charset="0"/>
+              </a:rPr>
+              <a:t>));</a:t>
+            </a:r>
+          </a:p>
+          <a:p>
+            <a:pPr marL="400050" lvl="1">
+              <a:lnSpc>
+                <a:spcPct val="107000"/>
+              </a:lnSpc>
+              <a:spcBef>
+                <a:spcPts val="0"/>
+              </a:spcBef>
+              <a:spcAft>
+                <a:spcPts val="800"/>
+              </a:spcAft>
+            </a:pPr>
+            <a:r>
+              <a:rPr lang="en-US" sz="2000" b="1" dirty="0" err="1">
+                <a:solidFill>
+                  <a:srgbClr val="2B91AF"/>
+                </a:solidFill>
+                <a:latin typeface="Consolas" panose="020B0609020204030204" pitchFamily="49" charset="0"/>
+                <a:ea typeface="Calibri" panose="020F0502020204030204" pitchFamily="34" charset="0"/>
+                <a:cs typeface="Consolas" panose="020B0609020204030204" pitchFamily="49" charset="0"/>
+              </a:rPr>
+              <a:t>unique_ptr</a:t>
+            </a:r>
+            <a:r>
               <a:rPr lang="en-US" sz="2000" b="1" dirty="0">
                 <a:solidFill>
                   <a:srgbClr val="000000"/>
@@ -38271,9 +38286,270 @@
                 <a:ea typeface="Calibri" panose="020F0502020204030204" pitchFamily="34" charset="0"/>
                 <a:cs typeface="Consolas" panose="020B0609020204030204" pitchFamily="49" charset="0"/>
               </a:rPr>
+              <a:t>&lt;</a:t>
+            </a:r>
+            <a:r>
+              <a:rPr lang="en-US" sz="2000" b="1" dirty="0">
+                <a:solidFill>
+                  <a:srgbClr val="2B91AF"/>
+                </a:solidFill>
+                <a:latin typeface="Consolas" panose="020B0609020204030204" pitchFamily="49" charset="0"/>
+                <a:ea typeface="Calibri" panose="020F0502020204030204" pitchFamily="34" charset="0"/>
+                <a:cs typeface="Consolas" panose="020B0609020204030204" pitchFamily="49" charset="0"/>
+              </a:rPr>
+              <a:t>node</a:t>
+            </a:r>
+            <a:r>
+              <a:rPr lang="en-US" sz="2000" b="1" dirty="0">
+                <a:solidFill>
+                  <a:srgbClr val="000000"/>
+                </a:solidFill>
+                <a:latin typeface="Consolas" panose="020B0609020204030204" pitchFamily="49" charset="0"/>
+                <a:ea typeface="Calibri" panose="020F0502020204030204" pitchFamily="34" charset="0"/>
+                <a:cs typeface="Consolas" panose="020B0609020204030204" pitchFamily="49" charset="0"/>
+              </a:rPr>
+              <a:t>&lt;</a:t>
+            </a:r>
+            <a:r>
+              <a:rPr lang="en-US" sz="2000" b="1" dirty="0">
+                <a:solidFill>
+                  <a:srgbClr val="2B91AF"/>
+                </a:solidFill>
+                <a:latin typeface="Consolas" panose="020B0609020204030204" pitchFamily="49" charset="0"/>
+                <a:ea typeface="Calibri" panose="020F0502020204030204" pitchFamily="34" charset="0"/>
+                <a:cs typeface="Consolas" panose="020B0609020204030204" pitchFamily="49" charset="0"/>
+              </a:rPr>
+              <a:t>T</a:t>
+            </a:r>
+            <a:r>
+              <a:rPr lang="en-US" sz="2000" b="1" dirty="0">
+                <a:solidFill>
+                  <a:srgbClr val="000000"/>
+                </a:solidFill>
+                <a:latin typeface="Consolas" panose="020B0609020204030204" pitchFamily="49" charset="0"/>
+                <a:ea typeface="Calibri" panose="020F0502020204030204" pitchFamily="34" charset="0"/>
+                <a:cs typeface="Consolas" panose="020B0609020204030204" pitchFamily="49" charset="0"/>
+              </a:rPr>
+              <a:t>&gt;&gt; </a:t>
+            </a:r>
+            <a:r>
+              <a:rPr lang="en-US" sz="2000" b="1" dirty="0" err="1">
+                <a:solidFill>
+                  <a:srgbClr val="000000"/>
+                </a:solidFill>
+                <a:latin typeface="Consolas" panose="020B0609020204030204" pitchFamily="49" charset="0"/>
+                <a:ea typeface="Calibri" panose="020F0502020204030204" pitchFamily="34" charset="0"/>
+                <a:cs typeface="Consolas" panose="020B0609020204030204" pitchFamily="49" charset="0"/>
+              </a:rPr>
+              <a:t>new_node</a:t>
+            </a:r>
+            <a:r>
+              <a:rPr lang="en-US" sz="2000" b="1" dirty="0">
+                <a:solidFill>
+                  <a:srgbClr val="000000"/>
+                </a:solidFill>
+                <a:latin typeface="Consolas" panose="020B0609020204030204" pitchFamily="49" charset="0"/>
+                <a:ea typeface="Calibri" panose="020F0502020204030204" pitchFamily="34" charset="0"/>
+                <a:cs typeface="Consolas" panose="020B0609020204030204" pitchFamily="49" charset="0"/>
+              </a:rPr>
+              <a:t> = </a:t>
+            </a:r>
+            <a:r>
+              <a:rPr lang="en-US" sz="2000" b="1" dirty="0" smtClean="0">
+                <a:solidFill>
+                  <a:srgbClr val="0000FF"/>
+                </a:solidFill>
+                <a:latin typeface="Consolas" panose="020B0609020204030204" pitchFamily="49" charset="0"/>
+                <a:ea typeface="Calibri" panose="020F0502020204030204" pitchFamily="34" charset="0"/>
+                <a:cs typeface="Consolas" panose="020B0609020204030204" pitchFamily="49" charset="0"/>
+              </a:rPr>
+              <a:t>new </a:t>
+            </a:r>
+            <a:r>
+              <a:rPr lang="en-US" sz="2000" b="1" dirty="0" err="1" smtClean="0">
+                <a:solidFill>
+                  <a:srgbClr val="2B91AF"/>
+                </a:solidFill>
+                <a:latin typeface="Consolas" panose="020B0609020204030204" pitchFamily="49" charset="0"/>
+                <a:ea typeface="Calibri" panose="020F0502020204030204" pitchFamily="34" charset="0"/>
+                <a:cs typeface="Consolas" panose="020B0609020204030204" pitchFamily="49" charset="0"/>
+              </a:rPr>
+              <a:t>unique_ptr</a:t>
+            </a:r>
+            <a:r>
+              <a:rPr lang="en-US" sz="2000" b="1" dirty="0" smtClean="0">
+                <a:solidFill>
+                  <a:srgbClr val="000000"/>
+                </a:solidFill>
+                <a:latin typeface="Consolas" panose="020B0609020204030204" pitchFamily="49" charset="0"/>
+                <a:ea typeface="Calibri" panose="020F0502020204030204" pitchFamily="34" charset="0"/>
+                <a:cs typeface="Consolas" panose="020B0609020204030204" pitchFamily="49" charset="0"/>
+              </a:rPr>
+              <a:t>&lt;</a:t>
+            </a:r>
+            <a:r>
+              <a:rPr lang="en-US" sz="2000" b="1" dirty="0" smtClean="0">
+                <a:solidFill>
+                  <a:srgbClr val="2B91AF"/>
+                </a:solidFill>
+                <a:latin typeface="Consolas" panose="020B0609020204030204" pitchFamily="49" charset="0"/>
+                <a:ea typeface="Calibri" panose="020F0502020204030204" pitchFamily="34" charset="0"/>
+                <a:cs typeface="Consolas" panose="020B0609020204030204" pitchFamily="49" charset="0"/>
+              </a:rPr>
+              <a:t>node</a:t>
+            </a:r>
+            <a:r>
+              <a:rPr lang="en-US" sz="2000" b="1" dirty="0" smtClean="0">
+                <a:solidFill>
+                  <a:srgbClr val="000000"/>
+                </a:solidFill>
+                <a:latin typeface="Consolas" panose="020B0609020204030204" pitchFamily="49" charset="0"/>
+                <a:ea typeface="Calibri" panose="020F0502020204030204" pitchFamily="34" charset="0"/>
+                <a:cs typeface="Consolas" panose="020B0609020204030204" pitchFamily="49" charset="0"/>
+              </a:rPr>
+              <a:t>&lt;</a:t>
+            </a:r>
+            <a:r>
+              <a:rPr lang="en-US" sz="2000" b="1" dirty="0" smtClean="0">
+                <a:solidFill>
+                  <a:srgbClr val="2B91AF"/>
+                </a:solidFill>
+                <a:latin typeface="Consolas" panose="020B0609020204030204" pitchFamily="49" charset="0"/>
+                <a:ea typeface="Calibri" panose="020F0502020204030204" pitchFamily="34" charset="0"/>
+                <a:cs typeface="Consolas" panose="020B0609020204030204" pitchFamily="49" charset="0"/>
+              </a:rPr>
+              <a:t>T</a:t>
+            </a:r>
+            <a:r>
+              <a:rPr lang="en-US" sz="2000" b="1" dirty="0">
+                <a:solidFill>
+                  <a:srgbClr val="000000"/>
+                </a:solidFill>
+                <a:latin typeface="Consolas" panose="020B0609020204030204" pitchFamily="49" charset="0"/>
+                <a:ea typeface="Calibri" panose="020F0502020204030204" pitchFamily="34" charset="0"/>
+                <a:cs typeface="Consolas" panose="020B0609020204030204" pitchFamily="49" charset="0"/>
+              </a:rPr>
+              <a:t>&gt;</a:t>
+            </a:r>
+            <a:r>
+              <a:rPr lang="en-US" sz="2000" b="1" dirty="0">
+                <a:latin typeface="Consolas" panose="020B0609020204030204" pitchFamily="49" charset="0"/>
+                <a:ea typeface="Calibri" panose="020F0502020204030204" pitchFamily="34" charset="0"/>
+                <a:cs typeface="Consolas" panose="020B0609020204030204" pitchFamily="49" charset="0"/>
+              </a:rPr>
+              <a:t>&gt;</a:t>
+            </a:r>
+            <a:r>
+              <a:rPr lang="en-US" sz="2000" b="1" dirty="0">
+                <a:solidFill>
+                  <a:srgbClr val="000000"/>
+                </a:solidFill>
+                <a:latin typeface="Consolas" panose="020B0609020204030204" pitchFamily="49" charset="0"/>
+                <a:ea typeface="Calibri" panose="020F0502020204030204" pitchFamily="34" charset="0"/>
+                <a:cs typeface="Consolas" panose="020B0609020204030204" pitchFamily="49" charset="0"/>
+              </a:rPr>
+              <a:t>(</a:t>
+            </a:r>
+            <a:r>
+              <a:rPr lang="en-US" sz="2000" b="1" dirty="0">
+                <a:solidFill>
+                  <a:srgbClr val="0000FF"/>
+                </a:solidFill>
+                <a:latin typeface="Consolas" panose="020B0609020204030204" pitchFamily="49" charset="0"/>
+                <a:ea typeface="Calibri" panose="020F0502020204030204" pitchFamily="34" charset="0"/>
+                <a:cs typeface="Consolas" panose="020B0609020204030204" pitchFamily="49" charset="0"/>
+              </a:rPr>
+              <a:t>new</a:t>
+            </a:r>
+            <a:r>
+              <a:rPr lang="en-US" sz="2000" b="1" dirty="0">
+                <a:solidFill>
+                  <a:srgbClr val="000000"/>
+                </a:solidFill>
+                <a:latin typeface="Consolas" panose="020B0609020204030204" pitchFamily="49" charset="0"/>
+                <a:ea typeface="Calibri" panose="020F0502020204030204" pitchFamily="34" charset="0"/>
+                <a:cs typeface="Consolas" panose="020B0609020204030204" pitchFamily="49" charset="0"/>
+              </a:rPr>
+              <a:t>  </a:t>
+            </a:r>
+            <a:r>
+              <a:rPr lang="en-US" sz="2000" b="1" dirty="0" smtClean="0">
+                <a:solidFill>
+                  <a:srgbClr val="000000"/>
+                </a:solidFill>
+                <a:latin typeface="Consolas" panose="020B0609020204030204" pitchFamily="49" charset="0"/>
+                <a:ea typeface="Calibri" panose="020F0502020204030204" pitchFamily="34" charset="0"/>
+                <a:cs typeface="Consolas" panose="020B0609020204030204" pitchFamily="49" charset="0"/>
+              </a:rPr>
+              <a:t> </a:t>
+            </a:r>
+            <a:r>
+              <a:rPr lang="en-US" sz="2000" b="1" dirty="0" smtClean="0">
+                <a:solidFill>
+                  <a:srgbClr val="2B91AF"/>
+                </a:solidFill>
+                <a:latin typeface="Consolas" panose="020B0609020204030204" pitchFamily="49" charset="0"/>
+                <a:ea typeface="Calibri" panose="020F0502020204030204" pitchFamily="34" charset="0"/>
+                <a:cs typeface="Consolas" panose="020B0609020204030204" pitchFamily="49" charset="0"/>
+              </a:rPr>
+              <a:t>node</a:t>
+            </a:r>
+            <a:r>
+              <a:rPr lang="en-US" sz="2000" b="1" dirty="0" smtClean="0">
+                <a:solidFill>
+                  <a:srgbClr val="000000"/>
+                </a:solidFill>
+                <a:latin typeface="Consolas" panose="020B0609020204030204" pitchFamily="49" charset="0"/>
+                <a:ea typeface="Calibri" panose="020F0502020204030204" pitchFamily="34" charset="0"/>
+                <a:cs typeface="Consolas" panose="020B0609020204030204" pitchFamily="49" charset="0"/>
+              </a:rPr>
+              <a:t>&lt;</a:t>
+            </a:r>
+            <a:r>
+              <a:rPr lang="en-US" sz="2000" b="1" dirty="0" smtClean="0">
+                <a:solidFill>
+                  <a:srgbClr val="2B91AF"/>
+                </a:solidFill>
+                <a:latin typeface="Consolas" panose="020B0609020204030204" pitchFamily="49" charset="0"/>
+                <a:ea typeface="Calibri" panose="020F0502020204030204" pitchFamily="34" charset="0"/>
+                <a:cs typeface="Consolas" panose="020B0609020204030204" pitchFamily="49" charset="0"/>
+              </a:rPr>
+              <a:t>T</a:t>
+            </a:r>
+            <a:r>
+              <a:rPr lang="en-US" sz="2000" b="1" dirty="0">
+                <a:solidFill>
+                  <a:srgbClr val="000000"/>
+                </a:solidFill>
+                <a:latin typeface="Consolas" panose="020B0609020204030204" pitchFamily="49" charset="0"/>
+                <a:ea typeface="Calibri" panose="020F0502020204030204" pitchFamily="34" charset="0"/>
+                <a:cs typeface="Consolas" panose="020B0609020204030204" pitchFamily="49" charset="0"/>
+              </a:rPr>
+              <a:t>&gt;(</a:t>
+            </a:r>
+            <a:r>
+              <a:rPr lang="en-US" sz="2000" b="1" dirty="0">
+                <a:solidFill>
+                  <a:srgbClr val="808080"/>
+                </a:solidFill>
+                <a:latin typeface="Consolas" panose="020B0609020204030204" pitchFamily="49" charset="0"/>
+                <a:ea typeface="Calibri" panose="020F0502020204030204" pitchFamily="34" charset="0"/>
+                <a:cs typeface="Consolas" panose="020B0609020204030204" pitchFamily="49" charset="0"/>
+              </a:rPr>
+              <a:t>value</a:t>
+            </a:r>
+            <a:r>
+              <a:rPr lang="en-US" sz="2000" b="1" dirty="0">
+                <a:solidFill>
+                  <a:srgbClr val="000000"/>
+                </a:solidFill>
+                <a:latin typeface="Consolas" panose="020B0609020204030204" pitchFamily="49" charset="0"/>
+                <a:ea typeface="Calibri" panose="020F0502020204030204" pitchFamily="34" charset="0"/>
+                <a:cs typeface="Consolas" panose="020B0609020204030204" pitchFamily="49" charset="0"/>
+              </a:rPr>
               <a:t>));</a:t>
             </a:r>
-            <a:endParaRPr lang="en-US" dirty="0">
+            <a:endParaRPr lang="en-US" sz="2000" dirty="0">
               <a:latin typeface="Calibri" panose="020F0502020204030204" pitchFamily="34" charset="0"/>
               <a:ea typeface="Calibri" panose="020F0502020204030204" pitchFamily="34" charset="0"/>
               <a:cs typeface="Times New Roman" panose="02020603050405020304" pitchFamily="18" charset="0"/>
@@ -39210,7 +39486,7 @@
         </p:spPr>
         <p:txBody>
           <a:bodyPr>
-            <a:normAutofit/>
+            <a:normAutofit lnSpcReduction="10000"/>
           </a:bodyPr>
           <a:lstStyle/>
           <a:p>
@@ -39331,8 +39607,57 @@
             </a:r>
             <a:r>
               <a:rPr lang="es-419" dirty="0" smtClean="0"/>
-              <a:t>punteros.</a:t>
-            </a:r>
+              <a:t>punteros</a:t>
+            </a:r>
+            <a:r>
+              <a:rPr lang="es-419" dirty="0" smtClean="0"/>
+              <a:t>.</a:t>
+            </a:r>
+          </a:p>
+          <a:p>
+            <a:pPr marL="0" indent="0">
+              <a:buNone/>
+            </a:pPr>
+            <a:r>
+              <a:rPr lang="es-419" sz="2400" dirty="0" smtClean="0">
+                <a:solidFill>
+                  <a:schemeClr val="accent1">
+                    <a:lumMod val="50000"/>
+                  </a:schemeClr>
+                </a:solidFill>
+                <a:latin typeface="Consolas" panose="020B0609020204030204" pitchFamily="49" charset="0"/>
+              </a:rPr>
+              <a:t>	-</a:t>
+            </a:r>
+            <a:r>
+              <a:rPr lang="es-419" dirty="0"/>
+              <a:t>Se puede transferir mediante </a:t>
+            </a:r>
+            <a:r>
+              <a:rPr lang="es-419" b="1" dirty="0" err="1">
+                <a:latin typeface="Consolas" panose="020B0609020204030204" pitchFamily="49" charset="0"/>
+              </a:rPr>
+              <a:t>std</a:t>
+            </a:r>
+            <a:r>
+              <a:rPr lang="es-419" b="1" dirty="0">
+                <a:latin typeface="Consolas" panose="020B0609020204030204" pitchFamily="49" charset="0"/>
+              </a:rPr>
+              <a:t>::</a:t>
+            </a:r>
+            <a:r>
+              <a:rPr lang="es-419" b="1" dirty="0" err="1">
+                <a:latin typeface="Consolas" panose="020B0609020204030204" pitchFamily="49" charset="0"/>
+              </a:rPr>
+              <a:t>move</a:t>
+            </a:r>
+            <a:r>
+              <a:rPr lang="es-419" b="1" dirty="0" smtClean="0">
+                <a:latin typeface="Consolas" panose="020B0609020204030204" pitchFamily="49" charset="0"/>
+              </a:rPr>
+              <a:t>.</a:t>
+            </a:r>
+            <a:endParaRPr lang="es-419" dirty="0" smtClean="0"/>
           </a:p>
           <a:p>
             <a:pPr marL="0" indent="0">

</xml_diff>